<commit_message>
Changes in Challenge 1 presentation.
</commit_message>
<xml_diff>
--- a/Challenges/German Credit Dataset Classification - Challenge 1/Ppt - German Credit Dataset Classification Challenge-1.pptx
+++ b/Challenges/German Credit Dataset Classification - Challenge 1/Ppt - German Credit Dataset Classification Challenge-1.pptx
@@ -1282,8 +1282,8 @@
     <dgm:cxn modelId="{B710CF99-B0AF-41C5-93AA-ABAA14EF22C7}" type="presOf" srcId="{63FA2AF9-2D10-497E-9157-EC44F4D7320C}" destId="{0C8C155F-305A-486E-B7B8-7C2CEF130136}" srcOrd="0" destOrd="0" presId="urn:microsoft.com/office/officeart/2005/8/layout/process1"/>
     <dgm:cxn modelId="{38CF61A1-B618-43E1-AFEE-7261E85E92B6}" type="presOf" srcId="{F79A40E6-9D47-4B3F-AAC2-1C27D05703B9}" destId="{FC52A0A9-3A7F-4474-A219-B62CDA5D0786}" srcOrd="0" destOrd="0" presId="urn:microsoft.com/office/officeart/2005/8/layout/process1"/>
     <dgm:cxn modelId="{EAF7F4FD-8A96-499C-9F04-6B88ADE77E43}" type="presOf" srcId="{B3136396-617E-40DE-94E5-4419C0F89848}" destId="{C8B53646-9373-46A0-9B26-DC49EF75D4F3}" srcOrd="1" destOrd="0" presId="urn:microsoft.com/office/officeart/2005/8/layout/process1"/>
+    <dgm:cxn modelId="{32C89380-DE10-4538-8904-3076ADF29E4A}" type="presOf" srcId="{29959815-D886-4B58-9DCB-51D7F54461E3}" destId="{5F423820-0B91-439E-A2AC-B466ADF028C1}" srcOrd="0" destOrd="0" presId="urn:microsoft.com/office/officeart/2005/8/layout/process1"/>
     <dgm:cxn modelId="{DB11EE60-E500-46C9-A55E-B2BEEFBA503B}" type="presOf" srcId="{63FA2AF9-2D10-497E-9157-EC44F4D7320C}" destId="{14F3C660-67D7-400F-8E84-3223E5633361}" srcOrd="1" destOrd="0" presId="urn:microsoft.com/office/officeart/2005/8/layout/process1"/>
-    <dgm:cxn modelId="{32C89380-DE10-4538-8904-3076ADF29E4A}" type="presOf" srcId="{29959815-D886-4B58-9DCB-51D7F54461E3}" destId="{5F423820-0B91-439E-A2AC-B466ADF028C1}" srcOrd="0" destOrd="0" presId="urn:microsoft.com/office/officeart/2005/8/layout/process1"/>
     <dgm:cxn modelId="{72C57326-4377-4842-91B2-38017920D375}" type="presParOf" srcId="{6281DDB5-E61D-4DA4-9045-051E963ECEA9}" destId="{5F423820-0B91-439E-A2AC-B466ADF028C1}" srcOrd="0" destOrd="0" presId="urn:microsoft.com/office/officeart/2005/8/layout/process1"/>
     <dgm:cxn modelId="{D3F0008F-3881-4A2E-BBC8-3E0C48C362DE}" type="presParOf" srcId="{6281DDB5-E61D-4DA4-9045-051E963ECEA9}" destId="{0C8C155F-305A-486E-B7B8-7C2CEF130136}" srcOrd="1" destOrd="0" presId="urn:microsoft.com/office/officeart/2005/8/layout/process1"/>
     <dgm:cxn modelId="{77066002-99FE-4580-B609-E0F12F701300}" type="presParOf" srcId="{0C8C155F-305A-486E-B7B8-7C2CEF130136}" destId="{14F3C660-67D7-400F-8E84-3223E5633361}" srcOrd="0" destOrd="0" presId="urn:microsoft.com/office/officeart/2005/8/layout/process1"/>
@@ -1310,379 +1310,6 @@
       <dsp:cNvGrpSpPr/>
     </dsp:nvGrpSpPr>
     <dsp:grpSpPr/>
-    <dsp:sp modelId="{5F423820-0B91-439E-A2AC-B466ADF028C1}">
-      <dsp:nvSpPr>
-        <dsp:cNvPr id="0" name=""/>
-        <dsp:cNvSpPr/>
-      </dsp:nvSpPr>
-      <dsp:spPr>
-        <a:xfrm>
-          <a:off x="7477" y="1144052"/>
-          <a:ext cx="2234824" cy="1340894"/>
-        </a:xfrm>
-        <a:prstGeom prst="roundRect">
-          <a:avLst>
-            <a:gd name="adj" fmla="val 10000"/>
-          </a:avLst>
-        </a:prstGeom>
-        <a:solidFill>
-          <a:schemeClr val="accent2">
-            <a:hueOff val="0"/>
-            <a:satOff val="0"/>
-            <a:lumOff val="0"/>
-            <a:alphaOff val="0"/>
-          </a:schemeClr>
-        </a:solidFill>
-        <a:ln w="19050" cap="rnd" cmpd="sng" algn="ctr">
-          <a:solidFill>
-            <a:schemeClr val="lt1">
-              <a:hueOff val="0"/>
-              <a:satOff val="0"/>
-              <a:lumOff val="0"/>
-              <a:alphaOff val="0"/>
-            </a:schemeClr>
-          </a:solidFill>
-          <a:prstDash val="solid"/>
-        </a:ln>
-        <a:effectLst/>
-      </dsp:spPr>
-      <dsp:style>
-        <a:lnRef idx="2">
-          <a:scrgbClr r="0" g="0" b="0"/>
-        </a:lnRef>
-        <a:fillRef idx="1">
-          <a:scrgbClr r="0" g="0" b="0"/>
-        </a:fillRef>
-        <a:effectRef idx="0">
-          <a:scrgbClr r="0" g="0" b="0"/>
-        </a:effectRef>
-        <a:fontRef idx="minor">
-          <a:schemeClr val="lt1"/>
-        </a:fontRef>
-      </dsp:style>
-      <dsp:txBody>
-        <a:bodyPr spcFirstLastPara="0" vert="horz" wrap="square" lIns="110490" tIns="110490" rIns="110490" bIns="110490" numCol="1" spcCol="1270" anchor="ctr" anchorCtr="0">
-          <a:noAutofit/>
-        </a:bodyPr>
-        <a:lstStyle/>
-        <a:p>
-          <a:pPr lvl="0" algn="ctr" defTabSz="1289050">
-            <a:lnSpc>
-              <a:spcPct val="90000"/>
-            </a:lnSpc>
-            <a:spcBef>
-              <a:spcPct val="0"/>
-            </a:spcBef>
-            <a:spcAft>
-              <a:spcPct val="35000"/>
-            </a:spcAft>
-          </a:pPr>
-          <a:r>
-            <a:rPr lang="en-IN" sz="2900" kern="1200" dirty="0" smtClean="0"/>
-            <a:t>Data Pre-processing</a:t>
-          </a:r>
-          <a:endParaRPr lang="en-IN" sz="2900" kern="1200" dirty="0"/>
-        </a:p>
-      </dsp:txBody>
-      <dsp:txXfrm>
-        <a:off x="46750" y="1183325"/>
-        <a:ext cx="2156278" cy="1262348"/>
-      </dsp:txXfrm>
-    </dsp:sp>
-    <dsp:sp modelId="{0C8C155F-305A-486E-B7B8-7C2CEF130136}">
-      <dsp:nvSpPr>
-        <dsp:cNvPr id="0" name=""/>
-        <dsp:cNvSpPr/>
-      </dsp:nvSpPr>
-      <dsp:spPr>
-        <a:xfrm>
-          <a:off x="2465784" y="1537381"/>
-          <a:ext cx="473782" cy="554236"/>
-        </a:xfrm>
-        <a:prstGeom prst="rightArrow">
-          <a:avLst>
-            <a:gd name="adj1" fmla="val 60000"/>
-            <a:gd name="adj2" fmla="val 50000"/>
-          </a:avLst>
-        </a:prstGeom>
-        <a:solidFill>
-          <a:schemeClr val="accent2">
-            <a:hueOff val="0"/>
-            <a:satOff val="0"/>
-            <a:lumOff val="0"/>
-            <a:alphaOff val="0"/>
-          </a:schemeClr>
-        </a:solidFill>
-        <a:ln>
-          <a:noFill/>
-        </a:ln>
-        <a:effectLst/>
-      </dsp:spPr>
-      <dsp:style>
-        <a:lnRef idx="0">
-          <a:scrgbClr r="0" g="0" b="0"/>
-        </a:lnRef>
-        <a:fillRef idx="1">
-          <a:scrgbClr r="0" g="0" b="0"/>
-        </a:fillRef>
-        <a:effectRef idx="0">
-          <a:scrgbClr r="0" g="0" b="0"/>
-        </a:effectRef>
-        <a:fontRef idx="minor">
-          <a:schemeClr val="lt1"/>
-        </a:fontRef>
-      </dsp:style>
-      <dsp:txBody>
-        <a:bodyPr spcFirstLastPara="0" vert="horz" wrap="square" lIns="0" tIns="0" rIns="0" bIns="0" numCol="1" spcCol="1270" anchor="ctr" anchorCtr="0">
-          <a:noAutofit/>
-        </a:bodyPr>
-        <a:lstStyle/>
-        <a:p>
-          <a:pPr lvl="0" algn="ctr" defTabSz="1022350">
-            <a:lnSpc>
-              <a:spcPct val="90000"/>
-            </a:lnSpc>
-            <a:spcBef>
-              <a:spcPct val="0"/>
-            </a:spcBef>
-            <a:spcAft>
-              <a:spcPct val="35000"/>
-            </a:spcAft>
-          </a:pPr>
-          <a:endParaRPr lang="en-IN" sz="2300" kern="1200"/>
-        </a:p>
-      </dsp:txBody>
-      <dsp:txXfrm>
-        <a:off x="2465784" y="1648228"/>
-        <a:ext cx="331647" cy="332542"/>
-      </dsp:txXfrm>
-    </dsp:sp>
-    <dsp:sp modelId="{7EE686EE-A570-4329-A676-9495E7BA419E}">
-      <dsp:nvSpPr>
-        <dsp:cNvPr id="0" name=""/>
-        <dsp:cNvSpPr/>
-      </dsp:nvSpPr>
-      <dsp:spPr>
-        <a:xfrm>
-          <a:off x="3136231" y="1144052"/>
-          <a:ext cx="2234824" cy="1340894"/>
-        </a:xfrm>
-        <a:prstGeom prst="roundRect">
-          <a:avLst>
-            <a:gd name="adj" fmla="val 10000"/>
-          </a:avLst>
-        </a:prstGeom>
-        <a:solidFill>
-          <a:schemeClr val="accent3">
-            <a:hueOff val="0"/>
-            <a:satOff val="0"/>
-            <a:lumOff val="0"/>
-            <a:alphaOff val="0"/>
-          </a:schemeClr>
-        </a:solidFill>
-        <a:ln w="19050" cap="rnd" cmpd="sng" algn="ctr">
-          <a:solidFill>
-            <a:schemeClr val="lt1">
-              <a:hueOff val="0"/>
-              <a:satOff val="0"/>
-              <a:lumOff val="0"/>
-              <a:alphaOff val="0"/>
-            </a:schemeClr>
-          </a:solidFill>
-          <a:prstDash val="solid"/>
-        </a:ln>
-        <a:effectLst/>
-      </dsp:spPr>
-      <dsp:style>
-        <a:lnRef idx="2">
-          <a:scrgbClr r="0" g="0" b="0"/>
-        </a:lnRef>
-        <a:fillRef idx="1">
-          <a:scrgbClr r="0" g="0" b="0"/>
-        </a:fillRef>
-        <a:effectRef idx="0">
-          <a:scrgbClr r="0" g="0" b="0"/>
-        </a:effectRef>
-        <a:fontRef idx="minor">
-          <a:schemeClr val="lt1"/>
-        </a:fontRef>
-      </dsp:style>
-      <dsp:txBody>
-        <a:bodyPr spcFirstLastPara="0" vert="horz" wrap="square" lIns="110490" tIns="110490" rIns="110490" bIns="110490" numCol="1" spcCol="1270" anchor="ctr" anchorCtr="0">
-          <a:noAutofit/>
-        </a:bodyPr>
-        <a:lstStyle/>
-        <a:p>
-          <a:pPr lvl="0" algn="ctr" defTabSz="1289050">
-            <a:lnSpc>
-              <a:spcPct val="90000"/>
-            </a:lnSpc>
-            <a:spcBef>
-              <a:spcPct val="0"/>
-            </a:spcBef>
-            <a:spcAft>
-              <a:spcPct val="35000"/>
-            </a:spcAft>
-          </a:pPr>
-          <a:r>
-            <a:rPr lang="en-IN" sz="2900" kern="1200" dirty="0" smtClean="0"/>
-            <a:t>Model</a:t>
-          </a:r>
-          <a:endParaRPr lang="en-IN" sz="2900" kern="1200" dirty="0"/>
-        </a:p>
-      </dsp:txBody>
-      <dsp:txXfrm>
-        <a:off x="3175504" y="1183325"/>
-        <a:ext cx="2156278" cy="1262348"/>
-      </dsp:txXfrm>
-    </dsp:sp>
-    <dsp:sp modelId="{E0F51D26-9C4E-46D9-B670-221DB66B1B1D}">
-      <dsp:nvSpPr>
-        <dsp:cNvPr id="0" name=""/>
-        <dsp:cNvSpPr/>
-      </dsp:nvSpPr>
-      <dsp:spPr>
-        <a:xfrm>
-          <a:off x="5594538" y="1537381"/>
-          <a:ext cx="473782" cy="554236"/>
-        </a:xfrm>
-        <a:prstGeom prst="rightArrow">
-          <a:avLst>
-            <a:gd name="adj1" fmla="val 60000"/>
-            <a:gd name="adj2" fmla="val 50000"/>
-          </a:avLst>
-        </a:prstGeom>
-        <a:solidFill>
-          <a:schemeClr val="accent3">
-            <a:hueOff val="0"/>
-            <a:satOff val="0"/>
-            <a:lumOff val="0"/>
-            <a:alphaOff val="0"/>
-          </a:schemeClr>
-        </a:solidFill>
-        <a:ln>
-          <a:noFill/>
-        </a:ln>
-        <a:effectLst/>
-      </dsp:spPr>
-      <dsp:style>
-        <a:lnRef idx="0">
-          <a:scrgbClr r="0" g="0" b="0"/>
-        </a:lnRef>
-        <a:fillRef idx="1">
-          <a:scrgbClr r="0" g="0" b="0"/>
-        </a:fillRef>
-        <a:effectRef idx="0">
-          <a:scrgbClr r="0" g="0" b="0"/>
-        </a:effectRef>
-        <a:fontRef idx="minor">
-          <a:schemeClr val="lt1"/>
-        </a:fontRef>
-      </dsp:style>
-      <dsp:txBody>
-        <a:bodyPr spcFirstLastPara="0" vert="horz" wrap="square" lIns="0" tIns="0" rIns="0" bIns="0" numCol="1" spcCol="1270" anchor="ctr" anchorCtr="0">
-          <a:noAutofit/>
-        </a:bodyPr>
-        <a:lstStyle/>
-        <a:p>
-          <a:pPr lvl="0" algn="ctr" defTabSz="1022350">
-            <a:lnSpc>
-              <a:spcPct val="90000"/>
-            </a:lnSpc>
-            <a:spcBef>
-              <a:spcPct val="0"/>
-            </a:spcBef>
-            <a:spcAft>
-              <a:spcPct val="35000"/>
-            </a:spcAft>
-          </a:pPr>
-          <a:endParaRPr lang="en-IN" sz="2300" kern="1200"/>
-        </a:p>
-      </dsp:txBody>
-      <dsp:txXfrm>
-        <a:off x="5594538" y="1648228"/>
-        <a:ext cx="331647" cy="332542"/>
-      </dsp:txXfrm>
-    </dsp:sp>
-    <dsp:sp modelId="{FC52A0A9-3A7F-4474-A219-B62CDA5D0786}">
-      <dsp:nvSpPr>
-        <dsp:cNvPr id="0" name=""/>
-        <dsp:cNvSpPr/>
-      </dsp:nvSpPr>
-      <dsp:spPr>
-        <a:xfrm>
-          <a:off x="6264986" y="1144052"/>
-          <a:ext cx="2234824" cy="1340894"/>
-        </a:xfrm>
-        <a:prstGeom prst="roundRect">
-          <a:avLst>
-            <a:gd name="adj" fmla="val 10000"/>
-          </a:avLst>
-        </a:prstGeom>
-        <a:solidFill>
-          <a:schemeClr val="accent4">
-            <a:hueOff val="0"/>
-            <a:satOff val="0"/>
-            <a:lumOff val="0"/>
-            <a:alphaOff val="0"/>
-          </a:schemeClr>
-        </a:solidFill>
-        <a:ln w="19050" cap="rnd" cmpd="sng" algn="ctr">
-          <a:solidFill>
-            <a:schemeClr val="lt1">
-              <a:hueOff val="0"/>
-              <a:satOff val="0"/>
-              <a:lumOff val="0"/>
-              <a:alphaOff val="0"/>
-            </a:schemeClr>
-          </a:solidFill>
-          <a:prstDash val="solid"/>
-        </a:ln>
-        <a:effectLst/>
-      </dsp:spPr>
-      <dsp:style>
-        <a:lnRef idx="2">
-          <a:scrgbClr r="0" g="0" b="0"/>
-        </a:lnRef>
-        <a:fillRef idx="1">
-          <a:scrgbClr r="0" g="0" b="0"/>
-        </a:fillRef>
-        <a:effectRef idx="0">
-          <a:scrgbClr r="0" g="0" b="0"/>
-        </a:effectRef>
-        <a:fontRef idx="minor">
-          <a:schemeClr val="lt1"/>
-        </a:fontRef>
-      </dsp:style>
-      <dsp:txBody>
-        <a:bodyPr spcFirstLastPara="0" vert="horz" wrap="square" lIns="110490" tIns="110490" rIns="110490" bIns="110490" numCol="1" spcCol="1270" anchor="ctr" anchorCtr="0">
-          <a:noAutofit/>
-        </a:bodyPr>
-        <a:lstStyle/>
-        <a:p>
-          <a:pPr lvl="0" algn="ctr" defTabSz="1289050">
-            <a:lnSpc>
-              <a:spcPct val="90000"/>
-            </a:lnSpc>
-            <a:spcBef>
-              <a:spcPct val="0"/>
-            </a:spcBef>
-            <a:spcAft>
-              <a:spcPct val="35000"/>
-            </a:spcAft>
-          </a:pPr>
-          <a:r>
-            <a:rPr lang="en-IN" sz="2900" kern="1200" dirty="0" smtClean="0"/>
-            <a:t>Analysis of Results</a:t>
-          </a:r>
-          <a:endParaRPr lang="en-IN" sz="2900" kern="1200" dirty="0"/>
-        </a:p>
-      </dsp:txBody>
-      <dsp:txXfrm>
-        <a:off x="6304259" y="1183325"/>
-        <a:ext cx="2156278" cy="1262348"/>
-      </dsp:txXfrm>
-    </dsp:sp>
   </dsp:spTree>
 </dsp:drawing>
 </file>
@@ -3009,7 +2636,7 @@
           <a:p>
             <a:fld id="{45E7852F-EE0E-4EA9-B1F4-5574BAAB74B8}" type="datetimeFigureOut">
               <a:rPr lang="en-IN" smtClean="0"/>
-              <a:t>08-11-2015</a:t>
+              <a:t>09-11-2015</a:t>
             </a:fld>
             <a:endParaRPr lang="en-IN"/>
           </a:p>
@@ -3184,7 +2811,7 @@
           <a:p>
             <a:fld id="{45E7852F-EE0E-4EA9-B1F4-5574BAAB74B8}" type="datetimeFigureOut">
               <a:rPr lang="en-IN" smtClean="0"/>
-              <a:t>08-11-2015</a:t>
+              <a:t>09-11-2015</a:t>
             </a:fld>
             <a:endParaRPr lang="en-IN"/>
           </a:p>
@@ -3364,7 +2991,7 @@
           <a:p>
             <a:fld id="{45E7852F-EE0E-4EA9-B1F4-5574BAAB74B8}" type="datetimeFigureOut">
               <a:rPr lang="en-IN" smtClean="0"/>
-              <a:t>08-11-2015</a:t>
+              <a:t>09-11-2015</a:t>
             </a:fld>
             <a:endParaRPr lang="en-IN"/>
           </a:p>
@@ -3572,7 +3199,7 @@
           <a:p>
             <a:fld id="{45E7852F-EE0E-4EA9-B1F4-5574BAAB74B8}" type="datetimeFigureOut">
               <a:rPr lang="en-IN" smtClean="0"/>
-              <a:t>08-11-2015</a:t>
+              <a:t>09-11-2015</a:t>
             </a:fld>
             <a:endParaRPr lang="en-IN"/>
           </a:p>
@@ -3747,7 +3374,7 @@
           <a:p>
             <a:fld id="{45E7852F-EE0E-4EA9-B1F4-5574BAAB74B8}" type="datetimeFigureOut">
               <a:rPr lang="en-IN" smtClean="0"/>
-              <a:t>08-11-2015</a:t>
+              <a:t>09-11-2015</a:t>
             </a:fld>
             <a:endParaRPr lang="en-IN"/>
           </a:p>
@@ -3998,7 +3625,7 @@
           <a:p>
             <a:fld id="{45E7852F-EE0E-4EA9-B1F4-5574BAAB74B8}" type="datetimeFigureOut">
               <a:rPr lang="en-IN" smtClean="0"/>
-              <a:t>08-11-2015</a:t>
+              <a:t>09-11-2015</a:t>
             </a:fld>
             <a:endParaRPr lang="en-IN"/>
           </a:p>
@@ -4235,7 +3862,7 @@
           <a:p>
             <a:fld id="{45E7852F-EE0E-4EA9-B1F4-5574BAAB74B8}" type="datetimeFigureOut">
               <a:rPr lang="en-IN" smtClean="0"/>
-              <a:t>08-11-2015</a:t>
+              <a:t>09-11-2015</a:t>
             </a:fld>
             <a:endParaRPr lang="en-IN"/>
           </a:p>
@@ -4587,7 +4214,7 @@
           <a:p>
             <a:fld id="{45E7852F-EE0E-4EA9-B1F4-5574BAAB74B8}" type="datetimeFigureOut">
               <a:rPr lang="en-IN" smtClean="0"/>
-              <a:t>08-11-2015</a:t>
+              <a:t>09-11-2015</a:t>
             </a:fld>
             <a:endParaRPr lang="en-IN"/>
           </a:p>
@@ -4710,7 +4337,7 @@
           <a:p>
             <a:fld id="{45E7852F-EE0E-4EA9-B1F4-5574BAAB74B8}" type="datetimeFigureOut">
               <a:rPr lang="en-IN" smtClean="0"/>
-              <a:t>08-11-2015</a:t>
+              <a:t>09-11-2015</a:t>
             </a:fld>
             <a:endParaRPr lang="en-IN"/>
           </a:p>
@@ -4828,7 +4455,7 @@
           <a:p>
             <a:fld id="{45E7852F-EE0E-4EA9-B1F4-5574BAAB74B8}" type="datetimeFigureOut">
               <a:rPr lang="en-IN" smtClean="0"/>
-              <a:t>08-11-2015</a:t>
+              <a:t>09-11-2015</a:t>
             </a:fld>
             <a:endParaRPr lang="en-IN"/>
           </a:p>
@@ -5117,7 +4744,7 @@
           <a:p>
             <a:fld id="{45E7852F-EE0E-4EA9-B1F4-5574BAAB74B8}" type="datetimeFigureOut">
               <a:rPr lang="en-IN" smtClean="0"/>
-              <a:t>08-11-2015</a:t>
+              <a:t>09-11-2015</a:t>
             </a:fld>
             <a:endParaRPr lang="en-IN"/>
           </a:p>
@@ -5292,7 +4919,7 @@
           <a:p>
             <a:fld id="{45E7852F-EE0E-4EA9-B1F4-5574BAAB74B8}" type="datetimeFigureOut">
               <a:rPr lang="en-IN" smtClean="0"/>
-              <a:t>08-11-2015</a:t>
+              <a:t>09-11-2015</a:t>
             </a:fld>
             <a:endParaRPr lang="en-IN"/>
           </a:p>
@@ -5556,7 +5183,7 @@
           <a:p>
             <a:fld id="{45E7852F-EE0E-4EA9-B1F4-5574BAAB74B8}" type="datetimeFigureOut">
               <a:rPr lang="en-IN" smtClean="0"/>
-              <a:t>08-11-2015</a:t>
+              <a:t>09-11-2015</a:t>
             </a:fld>
             <a:endParaRPr lang="en-IN"/>
           </a:p>
@@ -5726,7 +5353,7 @@
           <a:p>
             <a:fld id="{45E7852F-EE0E-4EA9-B1F4-5574BAAB74B8}" type="datetimeFigureOut">
               <a:rPr lang="en-IN" smtClean="0"/>
-              <a:t>08-11-2015</a:t>
+              <a:t>09-11-2015</a:t>
             </a:fld>
             <a:endParaRPr lang="en-IN"/>
           </a:p>
@@ -5906,7 +5533,7 @@
           <a:p>
             <a:fld id="{45E7852F-EE0E-4EA9-B1F4-5574BAAB74B8}" type="datetimeFigureOut">
               <a:rPr lang="en-IN" smtClean="0"/>
-              <a:t>08-11-2015</a:t>
+              <a:t>09-11-2015</a:t>
             </a:fld>
             <a:endParaRPr lang="en-IN"/>
           </a:p>
@@ -6408,7 +6035,7 @@
             </a:ln>
             <a:extLst>
               <a:ext uri="{91240B29-F687-4f45-9708-019B960494DF}">
-                <a14:hiddenLine xmlns="" xmlns:a14="http://schemas.microsoft.com/office/drawing/2010/main" w="9525">
+                <a14:hiddenLine xmlns:a14="http://schemas.microsoft.com/office/drawing/2010/main" xmlns="" w="9525">
                   <a:solidFill>
                     <a:srgbClr val="000000"/>
                   </a:solidFill>
@@ -6605,7 +6232,7 @@
           <a:p>
             <a:fld id="{45E7852F-EE0E-4EA9-B1F4-5574BAAB74B8}" type="datetimeFigureOut">
               <a:rPr lang="en-IN" smtClean="0"/>
-              <a:t>08-11-2015</a:t>
+              <a:t>09-11-2015</a:t>
             </a:fld>
             <a:endParaRPr lang="en-IN"/>
           </a:p>
@@ -6852,7 +6479,7 @@
           <a:p>
             <a:fld id="{45E7852F-EE0E-4EA9-B1F4-5574BAAB74B8}" type="datetimeFigureOut">
               <a:rPr lang="en-IN" smtClean="0"/>
-              <a:t>08-11-2015</a:t>
+              <a:t>09-11-2015</a:t>
             </a:fld>
             <a:endParaRPr lang="en-IN"/>
           </a:p>
@@ -7681,7 +7308,7 @@
             </a:ln>
             <a:extLst>
               <a:ext uri="{91240B29-F687-4f45-9708-019B960494DF}">
-                <a14:hiddenLine xmlns="" xmlns:a14="http://schemas.microsoft.com/office/drawing/2010/main" w="9525">
+                <a14:hiddenLine xmlns:a14="http://schemas.microsoft.com/office/drawing/2010/main" xmlns="" w="9525">
                   <a:solidFill>
                     <a:srgbClr val="000000"/>
                   </a:solidFill>
@@ -7863,7 +7490,7 @@
           <a:p>
             <a:fld id="{45E7852F-EE0E-4EA9-B1F4-5574BAAB74B8}" type="datetimeFigureOut">
               <a:rPr lang="en-IN" smtClean="0"/>
-              <a:t>08-11-2015</a:t>
+              <a:t>09-11-2015</a:t>
             </a:fld>
             <a:endParaRPr lang="en-IN"/>
           </a:p>
@@ -8152,7 +7779,7 @@
           <a:p>
             <a:fld id="{45E7852F-EE0E-4EA9-B1F4-5574BAAB74B8}" type="datetimeFigureOut">
               <a:rPr lang="en-IN" smtClean="0"/>
-              <a:t>08-11-2015</a:t>
+              <a:t>09-11-2015</a:t>
             </a:fld>
             <a:endParaRPr lang="en-IN"/>
           </a:p>
@@ -8557,7 +8184,7 @@
           <a:p>
             <a:fld id="{45E7852F-EE0E-4EA9-B1F4-5574BAAB74B8}" type="datetimeFigureOut">
               <a:rPr lang="en-IN" smtClean="0"/>
-              <a:t>08-11-2015</a:t>
+              <a:t>09-11-2015</a:t>
             </a:fld>
             <a:endParaRPr lang="en-IN"/>
           </a:p>
@@ -8692,7 +8319,7 @@
           <a:p>
             <a:fld id="{45E7852F-EE0E-4EA9-B1F4-5574BAAB74B8}" type="datetimeFigureOut">
               <a:rPr lang="en-IN" smtClean="0"/>
-              <a:t>08-11-2015</a:t>
+              <a:t>09-11-2015</a:t>
             </a:fld>
             <a:endParaRPr lang="en-IN"/>
           </a:p>
@@ -8835,7 +8462,7 @@
           <a:p>
             <a:fld id="{45E7852F-EE0E-4EA9-B1F4-5574BAAB74B8}" type="datetimeFigureOut">
               <a:rPr lang="en-IN" smtClean="0"/>
-              <a:t>08-11-2015</a:t>
+              <a:t>09-11-2015</a:t>
             </a:fld>
             <a:endParaRPr lang="en-IN"/>
           </a:p>
@@ -9098,7 +8725,7 @@
           <a:p>
             <a:fld id="{45E7852F-EE0E-4EA9-B1F4-5574BAAB74B8}" type="datetimeFigureOut">
               <a:rPr lang="en-IN" smtClean="0"/>
-              <a:t>08-11-2015</a:t>
+              <a:t>09-11-2015</a:t>
             </a:fld>
             <a:endParaRPr lang="en-IN"/>
           </a:p>
@@ -9920,7 +9547,7 @@
             </a:ln>
             <a:extLst>
               <a:ext uri="{91240B29-F687-4f45-9708-019B960494DF}">
-                <a14:hiddenLine xmlns="" xmlns:a14="http://schemas.microsoft.com/office/drawing/2010/main" w="9525">
+                <a14:hiddenLine xmlns:a14="http://schemas.microsoft.com/office/drawing/2010/main" xmlns="" w="9525">
                   <a:solidFill>
                     <a:srgbClr val="000000"/>
                   </a:solidFill>
@@ -10113,7 +9740,7 @@
           <a:p>
             <a:fld id="{45E7852F-EE0E-4EA9-B1F4-5574BAAB74B8}" type="datetimeFigureOut">
               <a:rPr lang="en-IN" smtClean="0"/>
-              <a:t>08-11-2015</a:t>
+              <a:t>09-11-2015</a:t>
             </a:fld>
             <a:endParaRPr lang="en-IN"/>
           </a:p>
@@ -10983,7 +10610,7 @@
             </a:ln>
             <a:extLst>
               <a:ext uri="{91240B29-F687-4f45-9708-019B960494DF}">
-                <a14:hiddenLine xmlns="" xmlns:a14="http://schemas.microsoft.com/office/drawing/2010/main" w="9525">
+                <a14:hiddenLine xmlns:a14="http://schemas.microsoft.com/office/drawing/2010/main" xmlns="" w="9525">
                   <a:solidFill>
                     <a:srgbClr val="000000"/>
                   </a:solidFill>
@@ -11200,7 +10827,7 @@
           <a:p>
             <a:fld id="{45E7852F-EE0E-4EA9-B1F4-5574BAAB74B8}" type="datetimeFigureOut">
               <a:rPr lang="en-IN" smtClean="0"/>
-              <a:t>08-11-2015</a:t>
+              <a:t>09-11-2015</a:t>
             </a:fld>
             <a:endParaRPr lang="en-IN"/>
           </a:p>
@@ -12069,7 +11696,7 @@
             </a:ln>
             <a:extLst>
               <a:ext uri="{91240B29-F687-4f45-9708-019B960494DF}">
-                <a14:hiddenLine xmlns="" xmlns:a14="http://schemas.microsoft.com/office/drawing/2010/main" w="9525">
+                <a14:hiddenLine xmlns:a14="http://schemas.microsoft.com/office/drawing/2010/main" xmlns="" w="9525">
                   <a:solidFill>
                     <a:srgbClr val="000000"/>
                   </a:solidFill>
@@ -12286,7 +11913,7 @@
           <a:p>
             <a:fld id="{45E7852F-EE0E-4EA9-B1F4-5574BAAB74B8}" type="datetimeFigureOut">
               <a:rPr lang="en-IN" smtClean="0"/>
-              <a:t>08-11-2015</a:t>
+              <a:t>09-11-2015</a:t>
             </a:fld>
             <a:endParaRPr lang="en-IN"/>
           </a:p>
@@ -13155,7 +12782,7 @@
             </a:ln>
             <a:extLst>
               <a:ext uri="{91240B29-F687-4f45-9708-019B960494DF}">
-                <a14:hiddenLine xmlns="" xmlns:a14="http://schemas.microsoft.com/office/drawing/2010/main" w="9525">
+                <a14:hiddenLine xmlns:a14="http://schemas.microsoft.com/office/drawing/2010/main" xmlns="" w="9525">
                   <a:solidFill>
                     <a:srgbClr val="000000"/>
                   </a:solidFill>
@@ -13284,7 +12911,7 @@
           <a:p>
             <a:fld id="{45E7852F-EE0E-4EA9-B1F4-5574BAAB74B8}" type="datetimeFigureOut">
               <a:rPr lang="en-IN" smtClean="0"/>
-              <a:t>08-11-2015</a:t>
+              <a:t>09-11-2015</a:t>
             </a:fld>
             <a:endParaRPr lang="en-IN"/>
           </a:p>
@@ -14116,7 +13743,7 @@
             </a:ln>
             <a:extLst>
               <a:ext uri="{91240B29-F687-4f45-9708-019B960494DF}">
-                <a14:hiddenLine xmlns="" xmlns:a14="http://schemas.microsoft.com/office/drawing/2010/main" w="9525">
+                <a14:hiddenLine xmlns:a14="http://schemas.microsoft.com/office/drawing/2010/main" xmlns="" w="9525">
                   <a:solidFill>
                     <a:srgbClr val="000000"/>
                   </a:solidFill>
@@ -14399,7 +14026,7 @@
           <a:p>
             <a:fld id="{45E7852F-EE0E-4EA9-B1F4-5574BAAB74B8}" type="datetimeFigureOut">
               <a:rPr lang="en-IN" smtClean="0"/>
-              <a:t>08-11-2015</a:t>
+              <a:t>09-11-2015</a:t>
             </a:fld>
             <a:endParaRPr lang="en-IN"/>
           </a:p>
@@ -15231,7 +14858,7 @@
             </a:ln>
             <a:extLst>
               <a:ext uri="{91240B29-F687-4f45-9708-019B960494DF}">
-                <a14:hiddenLine xmlns="" xmlns:a14="http://schemas.microsoft.com/office/drawing/2010/main" w="9525">
+                <a14:hiddenLine xmlns:a14="http://schemas.microsoft.com/office/drawing/2010/main" xmlns="" w="9525">
                   <a:solidFill>
                     <a:srgbClr val="000000"/>
                   </a:solidFill>
@@ -15413,7 +15040,7 @@
           <a:p>
             <a:fld id="{45E7852F-EE0E-4EA9-B1F4-5574BAAB74B8}" type="datetimeFigureOut">
               <a:rPr lang="en-IN" smtClean="0"/>
-              <a:t>08-11-2015</a:t>
+              <a:t>09-11-2015</a:t>
             </a:fld>
             <a:endParaRPr lang="en-IN"/>
           </a:p>
@@ -16085,7 +15712,7 @@
           <a:p>
             <a:fld id="{45E7852F-EE0E-4EA9-B1F4-5574BAAB74B8}" type="datetimeFigureOut">
               <a:rPr lang="en-IN" smtClean="0"/>
-              <a:t>08-11-2015</a:t>
+              <a:t>09-11-2015</a:t>
             </a:fld>
             <a:endParaRPr lang="en-IN"/>
           </a:p>
@@ -16958,7 +16585,7 @@
           <a:p>
             <a:fld id="{45E7852F-EE0E-4EA9-B1F4-5574BAAB74B8}" type="datetimeFigureOut">
               <a:rPr lang="en-IN" smtClean="0"/>
-              <a:t>08-11-2015</a:t>
+              <a:t>09-11-2015</a:t>
             </a:fld>
             <a:endParaRPr lang="en-IN"/>
           </a:p>
@@ -17145,7 +16772,7 @@
           <a:p>
             <a:fld id="{45E7852F-EE0E-4EA9-B1F4-5574BAAB74B8}" type="datetimeFigureOut">
               <a:rPr lang="en-IN" smtClean="0"/>
-              <a:t>08-11-2015</a:t>
+              <a:t>09-11-2015</a:t>
             </a:fld>
             <a:endParaRPr lang="en-IN"/>
           </a:p>
@@ -17980,7 +17607,7 @@
           </a:ln>
           <a:extLst>
             <a:ext uri="{91240B29-F687-4f45-9708-019B960494DF}">
-              <a14:hiddenLine xmlns="" xmlns:a14="http://schemas.microsoft.com/office/drawing/2010/main" w="9525">
+              <a14:hiddenLine xmlns:a14="http://schemas.microsoft.com/office/drawing/2010/main" xmlns="" w="9525">
                 <a:solidFill>
                   <a:srgbClr val="000000"/>
                 </a:solidFill>
@@ -18094,7 +17721,7 @@
           <a:p>
             <a:fld id="{45E7852F-EE0E-4EA9-B1F4-5574BAAB74B8}" type="datetimeFigureOut">
               <a:rPr lang="en-IN" smtClean="0"/>
-              <a:t>08-11-2015</a:t>
+              <a:t>09-11-2015</a:t>
             </a:fld>
             <a:endParaRPr lang="en-IN"/>
           </a:p>
@@ -18384,7 +18011,7 @@
           <a:p>
             <a:fld id="{45E7852F-EE0E-4EA9-B1F4-5574BAAB74B8}" type="datetimeFigureOut">
               <a:rPr lang="en-IN" smtClean="0"/>
-              <a:t>08-11-2015</a:t>
+              <a:t>09-11-2015</a:t>
             </a:fld>
             <a:endParaRPr lang="en-IN"/>
           </a:p>
@@ -18736,7 +18363,7 @@
           <a:p>
             <a:fld id="{45E7852F-EE0E-4EA9-B1F4-5574BAAB74B8}" type="datetimeFigureOut">
               <a:rPr lang="en-IN" smtClean="0"/>
-              <a:t>08-11-2015</a:t>
+              <a:t>09-11-2015</a:t>
             </a:fld>
             <a:endParaRPr lang="en-IN"/>
           </a:p>
@@ -18859,7 +18486,7 @@
           <a:p>
             <a:fld id="{45E7852F-EE0E-4EA9-B1F4-5574BAAB74B8}" type="datetimeFigureOut">
               <a:rPr lang="en-IN" smtClean="0"/>
-              <a:t>08-11-2015</a:t>
+              <a:t>09-11-2015</a:t>
             </a:fld>
             <a:endParaRPr lang="en-IN"/>
           </a:p>
@@ -18977,7 +18604,7 @@
           <a:p>
             <a:fld id="{45E7852F-EE0E-4EA9-B1F4-5574BAAB74B8}" type="datetimeFigureOut">
               <a:rPr lang="en-IN" smtClean="0"/>
-              <a:t>08-11-2015</a:t>
+              <a:t>09-11-2015</a:t>
             </a:fld>
             <a:endParaRPr lang="en-IN"/>
           </a:p>
@@ -19261,7 +18888,7 @@
           <a:p>
             <a:fld id="{45E7852F-EE0E-4EA9-B1F4-5574BAAB74B8}" type="datetimeFigureOut">
               <a:rPr lang="en-IN" smtClean="0"/>
-              <a:t>08-11-2015</a:t>
+              <a:t>09-11-2015</a:t>
             </a:fld>
             <a:endParaRPr lang="en-IN"/>
           </a:p>
@@ -19530,7 +19157,7 @@
           <a:p>
             <a:fld id="{45E7852F-EE0E-4EA9-B1F4-5574BAAB74B8}" type="datetimeFigureOut">
               <a:rPr lang="en-IN" smtClean="0"/>
-              <a:t>08-11-2015</a:t>
+              <a:t>09-11-2015</a:t>
             </a:fld>
             <a:endParaRPr lang="en-IN"/>
           </a:p>
@@ -19744,7 +19371,7 @@
           <a:p>
             <a:fld id="{45E7852F-EE0E-4EA9-B1F4-5574BAAB74B8}" type="datetimeFigureOut">
               <a:rPr lang="en-IN" smtClean="0"/>
-              <a:t>08-11-2015</a:t>
+              <a:t>09-11-2015</a:t>
             </a:fld>
             <a:endParaRPr lang="en-IN"/>
           </a:p>
@@ -20279,7 +19906,7 @@
           <a:p>
             <a:fld id="{45E7852F-EE0E-4EA9-B1F4-5574BAAB74B8}" type="datetimeFigureOut">
               <a:rPr lang="en-IN" smtClean="0"/>
-              <a:t>08-11-2015</a:t>
+              <a:t>09-11-2015</a:t>
             </a:fld>
             <a:endParaRPr lang="en-IN"/>
           </a:p>
@@ -21385,7 +21012,7 @@
             </a:ln>
             <a:extLst>
               <a:ext uri="{91240B29-F687-4f45-9708-019B960494DF}">
-                <a14:hiddenLine xmlns="" xmlns:a14="http://schemas.microsoft.com/office/drawing/2010/main" w="9525">
+                <a14:hiddenLine xmlns:a14="http://schemas.microsoft.com/office/drawing/2010/main" xmlns="" w="9525">
                   <a:solidFill>
                     <a:srgbClr val="000000"/>
                   </a:solidFill>
@@ -21526,7 +21153,7 @@
           <a:p>
             <a:fld id="{45E7852F-EE0E-4EA9-B1F4-5574BAAB74B8}" type="datetimeFigureOut">
               <a:rPr lang="en-IN" smtClean="0"/>
-              <a:t>08-11-2015</a:t>
+              <a:t>09-11-2015</a:t>
             </a:fld>
             <a:endParaRPr lang="en-IN"/>
           </a:p>
@@ -22176,6 +21803,255 @@
           </a:p>
         </p:txBody>
       </p:sp>
+      <p:sp>
+        <p:nvSpPr>
+          <p:cNvPr id="4" name="Subtitle 2"/>
+          <p:cNvSpPr txBox="1">
+            <a:spLocks/>
+          </p:cNvSpPr>
+          <p:nvPr/>
+        </p:nvSpPr>
+        <p:spPr>
+          <a:xfrm>
+            <a:off x="2843808" y="1772816"/>
+            <a:ext cx="2880320" cy="360040"/>
+          </a:xfrm>
+          <a:prstGeom prst="rect">
+            <a:avLst/>
+          </a:prstGeom>
+        </p:spPr>
+        <p:txBody>
+          <a:bodyPr vert="horz" lIns="91440" tIns="45720" rIns="91440" bIns="45720" rtlCol="0" anchor="t">
+            <a:normAutofit lnSpcReduction="10000"/>
+          </a:bodyPr>
+          <a:lstStyle>
+            <a:lvl1pPr marL="0" indent="0" algn="l" defTabSz="457200" rtl="0" eaLnBrk="1" latinLnBrk="0" hangingPunct="1">
+              <a:spcBef>
+                <a:spcPts val="1000"/>
+              </a:spcBef>
+              <a:spcAft>
+                <a:spcPts val="0"/>
+              </a:spcAft>
+              <a:buClr>
+                <a:schemeClr val="accent1"/>
+              </a:buClr>
+              <a:buSzPct val="80000"/>
+              <a:buFont typeface="Wingdings 3" charset="2"/>
+              <a:buNone/>
+              <a:defRPr sz="1800" b="0" i="0" kern="1200" cap="all">
+                <a:solidFill>
+                  <a:schemeClr val="accent1">
+                    <a:lumMod val="60000"/>
+                    <a:lumOff val="40000"/>
+                  </a:schemeClr>
+                </a:solidFill>
+                <a:latin typeface="+mn-lt"/>
+                <a:ea typeface="+mn-ea"/>
+                <a:cs typeface="+mn-cs"/>
+              </a:defRPr>
+            </a:lvl1pPr>
+            <a:lvl2pPr marL="457200" indent="0" algn="ctr" defTabSz="457200" rtl="0" eaLnBrk="1" latinLnBrk="0" hangingPunct="1">
+              <a:spcBef>
+                <a:spcPts val="1000"/>
+              </a:spcBef>
+              <a:spcAft>
+                <a:spcPts val="0"/>
+              </a:spcAft>
+              <a:buClr>
+                <a:schemeClr val="accent1"/>
+              </a:buClr>
+              <a:buSzPct val="80000"/>
+              <a:buFont typeface="Wingdings 3" charset="2"/>
+              <a:buNone/>
+              <a:defRPr sz="1600" b="0" i="0" kern="1200">
+                <a:solidFill>
+                  <a:schemeClr val="tx1">
+                    <a:tint val="75000"/>
+                  </a:schemeClr>
+                </a:solidFill>
+                <a:latin typeface="+mn-lt"/>
+                <a:ea typeface="+mn-ea"/>
+                <a:cs typeface="+mn-cs"/>
+              </a:defRPr>
+            </a:lvl2pPr>
+            <a:lvl3pPr marL="914400" indent="0" algn="ctr" defTabSz="457200" rtl="0" eaLnBrk="1" latinLnBrk="0" hangingPunct="1">
+              <a:spcBef>
+                <a:spcPts val="1000"/>
+              </a:spcBef>
+              <a:spcAft>
+                <a:spcPts val="0"/>
+              </a:spcAft>
+              <a:buClr>
+                <a:schemeClr val="accent1"/>
+              </a:buClr>
+              <a:buSzPct val="80000"/>
+              <a:buFont typeface="Wingdings 3" charset="2"/>
+              <a:buNone/>
+              <a:defRPr sz="1400" b="0" i="0" kern="1200">
+                <a:solidFill>
+                  <a:schemeClr val="tx1">
+                    <a:tint val="75000"/>
+                  </a:schemeClr>
+                </a:solidFill>
+                <a:latin typeface="+mn-lt"/>
+                <a:ea typeface="+mn-ea"/>
+                <a:cs typeface="+mn-cs"/>
+              </a:defRPr>
+            </a:lvl3pPr>
+            <a:lvl4pPr marL="1371600" indent="0" algn="ctr" defTabSz="457200" rtl="0" eaLnBrk="1" latinLnBrk="0" hangingPunct="1">
+              <a:spcBef>
+                <a:spcPts val="1000"/>
+              </a:spcBef>
+              <a:spcAft>
+                <a:spcPts val="0"/>
+              </a:spcAft>
+              <a:buClr>
+                <a:schemeClr val="accent1"/>
+              </a:buClr>
+              <a:buSzPct val="80000"/>
+              <a:buFont typeface="Wingdings 3" charset="2"/>
+              <a:buNone/>
+              <a:defRPr sz="1200" b="0" i="0" kern="1200">
+                <a:solidFill>
+                  <a:schemeClr val="tx1">
+                    <a:tint val="75000"/>
+                  </a:schemeClr>
+                </a:solidFill>
+                <a:latin typeface="+mn-lt"/>
+                <a:ea typeface="+mn-ea"/>
+                <a:cs typeface="+mn-cs"/>
+              </a:defRPr>
+            </a:lvl4pPr>
+            <a:lvl5pPr marL="1828800" indent="0" algn="ctr" defTabSz="457200" rtl="0" eaLnBrk="1" latinLnBrk="0" hangingPunct="1">
+              <a:spcBef>
+                <a:spcPts val="1000"/>
+              </a:spcBef>
+              <a:spcAft>
+                <a:spcPts val="0"/>
+              </a:spcAft>
+              <a:buClr>
+                <a:schemeClr val="accent1"/>
+              </a:buClr>
+              <a:buSzPct val="80000"/>
+              <a:buFont typeface="Wingdings 3" charset="2"/>
+              <a:buNone/>
+              <a:defRPr sz="1200" b="0" i="0" kern="1200">
+                <a:solidFill>
+                  <a:schemeClr val="tx1">
+                    <a:tint val="75000"/>
+                  </a:schemeClr>
+                </a:solidFill>
+                <a:latin typeface="+mn-lt"/>
+                <a:ea typeface="+mn-ea"/>
+                <a:cs typeface="+mn-cs"/>
+              </a:defRPr>
+            </a:lvl5pPr>
+            <a:lvl6pPr marL="2286000" indent="0" algn="ctr" defTabSz="457200" rtl="0" eaLnBrk="1" latinLnBrk="0" hangingPunct="1">
+              <a:spcBef>
+                <a:spcPts val="1000"/>
+              </a:spcBef>
+              <a:spcAft>
+                <a:spcPts val="0"/>
+              </a:spcAft>
+              <a:buClr>
+                <a:schemeClr val="accent1"/>
+              </a:buClr>
+              <a:buSzPct val="80000"/>
+              <a:buFont typeface="Wingdings 3" charset="2"/>
+              <a:buNone/>
+              <a:defRPr sz="1200" b="0" i="0" kern="1200">
+                <a:solidFill>
+                  <a:schemeClr val="tx1">
+                    <a:tint val="75000"/>
+                  </a:schemeClr>
+                </a:solidFill>
+                <a:latin typeface="+mn-lt"/>
+                <a:ea typeface="+mn-ea"/>
+                <a:cs typeface="+mn-cs"/>
+              </a:defRPr>
+            </a:lvl6pPr>
+            <a:lvl7pPr marL="2743200" indent="0" algn="ctr" defTabSz="457200" rtl="0" eaLnBrk="1" latinLnBrk="0" hangingPunct="1">
+              <a:spcBef>
+                <a:spcPts val="1000"/>
+              </a:spcBef>
+              <a:spcAft>
+                <a:spcPts val="0"/>
+              </a:spcAft>
+              <a:buClr>
+                <a:schemeClr val="accent1"/>
+              </a:buClr>
+              <a:buSzPct val="80000"/>
+              <a:buFont typeface="Wingdings 3" charset="2"/>
+              <a:buNone/>
+              <a:defRPr sz="1200" b="0" i="0" kern="1200">
+                <a:solidFill>
+                  <a:schemeClr val="tx1">
+                    <a:tint val="75000"/>
+                  </a:schemeClr>
+                </a:solidFill>
+                <a:latin typeface="+mn-lt"/>
+                <a:ea typeface="+mn-ea"/>
+                <a:cs typeface="+mn-cs"/>
+              </a:defRPr>
+            </a:lvl7pPr>
+            <a:lvl8pPr marL="3200400" indent="0" algn="ctr" defTabSz="457200" rtl="0" eaLnBrk="1" latinLnBrk="0" hangingPunct="1">
+              <a:spcBef>
+                <a:spcPts val="1000"/>
+              </a:spcBef>
+              <a:spcAft>
+                <a:spcPts val="0"/>
+              </a:spcAft>
+              <a:buClr>
+                <a:schemeClr val="accent1"/>
+              </a:buClr>
+              <a:buSzPct val="80000"/>
+              <a:buFont typeface="Wingdings 3" charset="2"/>
+              <a:buNone/>
+              <a:defRPr sz="1200" b="0" i="0" kern="1200">
+                <a:solidFill>
+                  <a:schemeClr val="tx1">
+                    <a:tint val="75000"/>
+                  </a:schemeClr>
+                </a:solidFill>
+                <a:latin typeface="+mn-lt"/>
+                <a:ea typeface="+mn-ea"/>
+                <a:cs typeface="+mn-cs"/>
+              </a:defRPr>
+            </a:lvl8pPr>
+            <a:lvl9pPr marL="3657600" indent="0" algn="ctr" defTabSz="457200" rtl="0" eaLnBrk="1" latinLnBrk="0" hangingPunct="1">
+              <a:spcBef>
+                <a:spcPts val="1000"/>
+              </a:spcBef>
+              <a:spcAft>
+                <a:spcPts val="0"/>
+              </a:spcAft>
+              <a:buClr>
+                <a:schemeClr val="accent1"/>
+              </a:buClr>
+              <a:buSzPct val="80000"/>
+              <a:buFont typeface="Wingdings 3" charset="2"/>
+              <a:buNone/>
+              <a:defRPr sz="1200" b="0" i="0" kern="1200">
+                <a:solidFill>
+                  <a:schemeClr val="tx1">
+                    <a:tint val="75000"/>
+                  </a:schemeClr>
+                </a:solidFill>
+                <a:latin typeface="+mn-lt"/>
+                <a:ea typeface="+mn-ea"/>
+                <a:cs typeface="+mn-cs"/>
+              </a:defRPr>
+            </a:lvl9pPr>
+          </a:lstStyle>
+          <a:p>
+            <a:r>
+              <a:rPr lang="en-IN" b="1" dirty="0" smtClean="0"/>
+              <a:t>“The Outliers” presents</a:t>
+            </a:r>
+            <a:endParaRPr lang="en-IN" b="1" dirty="0"/>
+          </a:p>
+        </p:txBody>
+      </p:sp>
     </p:spTree>
     <p:extLst>
       <p:ext uri="{BB962C8B-B14F-4D97-AF65-F5344CB8AC3E}">
@@ -23001,19 +22877,11 @@
             </a:r>
             <a:r>
               <a:rPr lang="en-IN" dirty="0"/>
-              <a:t> </a:t>
-            </a:r>
-            <a:r>
-              <a:rPr lang="en-IN" dirty="0"/>
-              <a:t>C</a:t>
+              <a:t> C</a:t>
             </a:r>
             <a:r>
               <a:rPr lang="en-IN" dirty="0" smtClean="0"/>
-              <a:t>lassification </a:t>
-            </a:r>
-            <a:r>
-              <a:rPr lang="en-IN" dirty="0" smtClean="0"/>
-              <a:t>of users with respect to their credit worthiness</a:t>
+              <a:t>lassification of users with respect to their credit worthiness</a:t>
             </a:r>
           </a:p>
           <a:p>
@@ -23853,13 +23721,8 @@
             <a:pPr lvl="1"/>
             <a:r>
               <a:rPr lang="en-IN" dirty="0" smtClean="0"/>
-              <a:t>SVM with </a:t>
-            </a:r>
-            <a:r>
-              <a:rPr lang="en-IN" dirty="0" smtClean="0"/>
-              <a:t>Kernels – Linear, RBF &amp; Non-linear</a:t>
-            </a:r>
-            <a:endParaRPr lang="en-IN" dirty="0" smtClean="0"/>
+              <a:t>SVM with Kernels – Linear, RBF &amp; Non-linear</a:t>
+            </a:r>
           </a:p>
           <a:p>
             <a:endParaRPr lang="en-IN" dirty="0" smtClean="0"/>

</xml_diff>